<commit_message>
finish basic structure of Mex as derived class of PixelCanvas and BaseWindow
</commit_message>
<xml_diff>
--- a/docs/diagram.pptx
+++ b/docs/diagram.pptx
@@ -259,7 +259,7 @@
           <a:p>
             <a:fld id="{A771D1FC-723A-4F69-B9E5-84AC116D049D}" type="datetimeFigureOut">
               <a:rPr lang="en-US" smtClean="0"/>
-              <a:t>3/2/2025</a:t>
+              <a:t>3/7/2025</a:t>
             </a:fld>
             <a:endParaRPr lang="en-US"/>
           </a:p>
@@ -457,7 +457,7 @@
           <a:p>
             <a:fld id="{A771D1FC-723A-4F69-B9E5-84AC116D049D}" type="datetimeFigureOut">
               <a:rPr lang="en-US" smtClean="0"/>
-              <a:t>3/2/2025</a:t>
+              <a:t>3/7/2025</a:t>
             </a:fld>
             <a:endParaRPr lang="en-US"/>
           </a:p>
@@ -665,7 +665,7 @@
           <a:p>
             <a:fld id="{A771D1FC-723A-4F69-B9E5-84AC116D049D}" type="datetimeFigureOut">
               <a:rPr lang="en-US" smtClean="0"/>
-              <a:t>3/2/2025</a:t>
+              <a:t>3/7/2025</a:t>
             </a:fld>
             <a:endParaRPr lang="en-US"/>
           </a:p>
@@ -863,7 +863,7 @@
           <a:p>
             <a:fld id="{A771D1FC-723A-4F69-B9E5-84AC116D049D}" type="datetimeFigureOut">
               <a:rPr lang="en-US" smtClean="0"/>
-              <a:t>3/2/2025</a:t>
+              <a:t>3/7/2025</a:t>
             </a:fld>
             <a:endParaRPr lang="en-US"/>
           </a:p>
@@ -1138,7 +1138,7 @@
           <a:p>
             <a:fld id="{A771D1FC-723A-4F69-B9E5-84AC116D049D}" type="datetimeFigureOut">
               <a:rPr lang="en-US" smtClean="0"/>
-              <a:t>3/2/2025</a:t>
+              <a:t>3/7/2025</a:t>
             </a:fld>
             <a:endParaRPr lang="en-US"/>
           </a:p>
@@ -1403,7 +1403,7 @@
           <a:p>
             <a:fld id="{A771D1FC-723A-4F69-B9E5-84AC116D049D}" type="datetimeFigureOut">
               <a:rPr lang="en-US" smtClean="0"/>
-              <a:t>3/2/2025</a:t>
+              <a:t>3/7/2025</a:t>
             </a:fld>
             <a:endParaRPr lang="en-US"/>
           </a:p>
@@ -1815,7 +1815,7 @@
           <a:p>
             <a:fld id="{A771D1FC-723A-4F69-B9E5-84AC116D049D}" type="datetimeFigureOut">
               <a:rPr lang="en-US" smtClean="0"/>
-              <a:t>3/2/2025</a:t>
+              <a:t>3/7/2025</a:t>
             </a:fld>
             <a:endParaRPr lang="en-US"/>
           </a:p>
@@ -1956,7 +1956,7 @@
           <a:p>
             <a:fld id="{A771D1FC-723A-4F69-B9E5-84AC116D049D}" type="datetimeFigureOut">
               <a:rPr lang="en-US" smtClean="0"/>
-              <a:t>3/2/2025</a:t>
+              <a:t>3/7/2025</a:t>
             </a:fld>
             <a:endParaRPr lang="en-US"/>
           </a:p>
@@ -2069,7 +2069,7 @@
           <a:p>
             <a:fld id="{A771D1FC-723A-4F69-B9E5-84AC116D049D}" type="datetimeFigureOut">
               <a:rPr lang="en-US" smtClean="0"/>
-              <a:t>3/2/2025</a:t>
+              <a:t>3/7/2025</a:t>
             </a:fld>
             <a:endParaRPr lang="en-US"/>
           </a:p>
@@ -2380,7 +2380,7 @@
           <a:p>
             <a:fld id="{A771D1FC-723A-4F69-B9E5-84AC116D049D}" type="datetimeFigureOut">
               <a:rPr lang="en-US" smtClean="0"/>
-              <a:t>3/2/2025</a:t>
+              <a:t>3/7/2025</a:t>
             </a:fld>
             <a:endParaRPr lang="en-US"/>
           </a:p>
@@ -2668,7 +2668,7 @@
           <a:p>
             <a:fld id="{A771D1FC-723A-4F69-B9E5-84AC116D049D}" type="datetimeFigureOut">
               <a:rPr lang="en-US" smtClean="0"/>
-              <a:t>3/2/2025</a:t>
+              <a:t>3/7/2025</a:t>
             </a:fld>
             <a:endParaRPr lang="en-US"/>
           </a:p>
@@ -2909,7 +2909,7 @@
           <a:p>
             <a:fld id="{A771D1FC-723A-4F69-B9E5-84AC116D049D}" type="datetimeFigureOut">
               <a:rPr lang="en-US" smtClean="0"/>
-              <a:t>3/2/2025</a:t>
+              <a:t>3/7/2025</a:t>
             </a:fld>
             <a:endParaRPr lang="en-US"/>
           </a:p>
@@ -3598,13 +3598,26 @@
             </a:pPr>
             <a:r>
               <a:rPr lang="en-US" sz="1200" dirty="0"/>
-              <a:t>Initialize canvas upon </a:t>
-            </a:r>
-            <a:r>
-              <a:rPr lang="en-US" sz="1200"/>
-              <a:t>window creation</a:t>
-            </a:r>
-            <a:endParaRPr lang="en-US" sz="1200" dirty="0"/>
+              <a:t>Initialize canvas upon window creation</a:t>
+            </a:r>
+          </a:p>
+          <a:p>
+            <a:pPr marL="342900" indent="-342900">
+              <a:buFont typeface="Arial" panose="020B0604020202020204" pitchFamily="34" charset="0"/>
+              <a:buChar char="•"/>
+            </a:pPr>
+            <a:r>
+              <a:rPr lang="en-US" sz="1200" dirty="0"/>
+              <a:t>Manage internal </a:t>
+            </a:r>
+            <a:r>
+              <a:rPr lang="en-US" sz="1200" dirty="0" err="1"/>
+              <a:t>PatternMemory</a:t>
+            </a:r>
+            <a:r>
+              <a:rPr lang="en-US" sz="1200" dirty="0"/>
+              <a:t> to store pre-loaded/dynamically-generated patterns</a:t>
+            </a:r>
           </a:p>
         </p:txBody>
       </p:sp>

</xml_diff>